<commit_message>
add 文档大纲 in slides, group 2
</commit_message>
<xml_diff>
--- a/weekly_report/group2/第7周汇报.pptx
+++ b/weekly_report/group2/第7周汇报.pptx
@@ -10,6 +10,7 @@
     <p:sldId id="267" r:id="rId4"/>
     <p:sldId id="266" r:id="rId5"/>
     <p:sldId id="268" r:id="rId6"/>
+    <p:sldId id="269" r:id="rId7"/>
   </p:sldIdLst>
   <p:sldSz cx="12192000" cy="6858000"/>
   <p:notesSz cx="6858000" cy="9144000"/>
@@ -4573,7 +4574,7 @@
           <a:p>
             <a:r>
               <a:rPr lang="en-US" altLang="zh-CN" dirty="0"/>
-              <a:t>modularization</a:t>
+              <a:t>Modularization</a:t>
             </a:r>
           </a:p>
           <a:p>
@@ -4664,6 +4665,794 @@
     <p:extLst>
       <p:ext uri="{BB962C8B-B14F-4D97-AF65-F5344CB8AC3E}">
         <p14:creationId xmlns:p14="http://schemas.microsoft.com/office/powerpoint/2010/main" val="622051799"/>
+      </p:ext>
+    </p:extLst>
+  </p:cSld>
+  <p:clrMapOvr>
+    <a:masterClrMapping/>
+  </p:clrMapOvr>
+</p:sld>
+</file>
+
+<file path=ppt/slides/slide6.xml><?xml version="1.0" encoding="utf-8"?>
+<p:sld xmlns:a="http://schemas.openxmlformats.org/drawingml/2006/main" xmlns:r="http://schemas.openxmlformats.org/officeDocument/2006/relationships" xmlns:p="http://schemas.openxmlformats.org/presentationml/2006/main">
+  <p:cSld>
+    <p:spTree>
+      <p:nvGrpSpPr>
+        <p:cNvPr id="1" name=""/>
+        <p:cNvGrpSpPr/>
+        <p:nvPr/>
+      </p:nvGrpSpPr>
+      <p:grpSpPr>
+        <a:xfrm>
+          <a:off x="0" y="0"/>
+          <a:ext cx="0" cy="0"/>
+          <a:chOff x="0" y="0"/>
+          <a:chExt cx="0" cy="0"/>
+        </a:xfrm>
+      </p:grpSpPr>
+      <p:sp>
+        <p:nvSpPr>
+          <p:cNvPr id="2" name="标题 1">
+            <a:extLst>
+              <a:ext uri="{FF2B5EF4-FFF2-40B4-BE49-F238E27FC236}">
+                <a16:creationId xmlns:a16="http://schemas.microsoft.com/office/drawing/2014/main" id="{819418B2-D9D9-4954-BBBB-A26A355CF4F0}"/>
+              </a:ext>
+            </a:extLst>
+          </p:cNvPr>
+          <p:cNvSpPr>
+            <a:spLocks noGrp="1"/>
+          </p:cNvSpPr>
+          <p:nvPr>
+            <p:ph type="title"/>
+          </p:nvPr>
+        </p:nvSpPr>
+        <p:spPr/>
+        <p:txBody>
+          <a:bodyPr/>
+          <a:lstStyle/>
+          <a:p>
+            <a:r>
+              <a:rPr lang="zh-CN" altLang="en-US" dirty="0"/>
+              <a:t>文档大纲</a:t>
+            </a:r>
+          </a:p>
+        </p:txBody>
+      </p:sp>
+      <p:sp>
+        <p:nvSpPr>
+          <p:cNvPr id="3" name="内容占位符 2">
+            <a:extLst>
+              <a:ext uri="{FF2B5EF4-FFF2-40B4-BE49-F238E27FC236}">
+                <a16:creationId xmlns:a16="http://schemas.microsoft.com/office/drawing/2014/main" id="{AFE66FF7-E9E2-4094-AA08-C33DD4262A4A}"/>
+              </a:ext>
+            </a:extLst>
+          </p:cNvPr>
+          <p:cNvSpPr>
+            <a:spLocks noGrp="1"/>
+          </p:cNvSpPr>
+          <p:nvPr>
+            <p:ph idx="1"/>
+          </p:nvPr>
+        </p:nvSpPr>
+        <p:spPr>
+          <a:xfrm>
+            <a:off x="838200" y="1825625"/>
+            <a:ext cx="3635188" cy="4351338"/>
+          </a:xfrm>
+        </p:spPr>
+        <p:txBody>
+          <a:bodyPr/>
+          <a:lstStyle/>
+          <a:p>
+            <a:r>
+              <a:rPr lang="en-US" altLang="zh-CN" dirty="0"/>
+              <a:t>0. </a:t>
+            </a:r>
+            <a:r>
+              <a:rPr lang="en-US" altLang="zh-CN" b="1" dirty="0">
+                <a:solidFill>
+                  <a:schemeClr val="accent1"/>
+                </a:solidFill>
+              </a:rPr>
+              <a:t>Introduction</a:t>
+            </a:r>
+          </a:p>
+          <a:p>
+            <a:pPr lvl="1"/>
+            <a:r>
+              <a:rPr lang="en-US" altLang="zh-CN" dirty="0"/>
+              <a:t>How compilers work</a:t>
+            </a:r>
+          </a:p>
+          <a:p>
+            <a:pPr lvl="1"/>
+            <a:r>
+              <a:rPr lang="en-US" altLang="zh-CN" dirty="0"/>
+              <a:t>Logical</a:t>
+            </a:r>
+            <a:r>
+              <a:rPr lang="zh-CN" altLang="en-US" dirty="0"/>
+              <a:t> </a:t>
+            </a:r>
+            <a:r>
+              <a:rPr lang="en-US" altLang="zh-CN" dirty="0"/>
+              <a:t>model</a:t>
+            </a:r>
+          </a:p>
+          <a:p>
+            <a:endParaRPr lang="en-US" altLang="zh-CN" dirty="0"/>
+          </a:p>
+          <a:p>
+            <a:r>
+              <a:rPr lang="en-US" altLang="zh-CN" dirty="0"/>
+              <a:t>1. </a:t>
+            </a:r>
+            <a:r>
+              <a:rPr lang="en-US" altLang="zh-CN" b="1" dirty="0">
+                <a:solidFill>
+                  <a:srgbClr val="00B050"/>
+                </a:solidFill>
+              </a:rPr>
+              <a:t>Tokenization</a:t>
+            </a:r>
+          </a:p>
+          <a:p>
+            <a:pPr lvl="1"/>
+            <a:r>
+              <a:rPr lang="en-US" altLang="zh-CN" dirty="0"/>
+              <a:t>Finite state machines</a:t>
+            </a:r>
+          </a:p>
+          <a:p>
+            <a:pPr lvl="1"/>
+            <a:r>
+              <a:rPr lang="en-US" altLang="zh-CN" dirty="0"/>
+              <a:t>Design Tokenizer module by contract</a:t>
+            </a:r>
+          </a:p>
+        </p:txBody>
+      </p:sp>
+      <p:sp>
+        <p:nvSpPr>
+          <p:cNvPr id="4" name="内容占位符 2">
+            <a:extLst>
+              <a:ext uri="{FF2B5EF4-FFF2-40B4-BE49-F238E27FC236}">
+                <a16:creationId xmlns:a16="http://schemas.microsoft.com/office/drawing/2014/main" id="{F95361B8-6C83-4C56-B67F-5D1129A45D77}"/>
+              </a:ext>
+            </a:extLst>
+          </p:cNvPr>
+          <p:cNvSpPr txBox="1">
+            <a:spLocks/>
+          </p:cNvSpPr>
+          <p:nvPr/>
+        </p:nvSpPr>
+        <p:spPr>
+          <a:xfrm>
+            <a:off x="4401671" y="1690688"/>
+            <a:ext cx="3635188" cy="4351338"/>
+          </a:xfrm>
+          <a:prstGeom prst="rect">
+            <a:avLst/>
+          </a:prstGeom>
+        </p:spPr>
+        <p:txBody>
+          <a:bodyPr vert="horz" lIns="91440" tIns="45720" rIns="91440" bIns="45720" rtlCol="0">
+            <a:normAutofit/>
+          </a:bodyPr>
+          <a:lstStyle>
+            <a:lvl1pPr marL="228600" indent="-228600" algn="l" defTabSz="914400" rtl="0" eaLnBrk="1" latinLnBrk="0" hangingPunct="1">
+              <a:lnSpc>
+                <a:spcPct val="90000"/>
+              </a:lnSpc>
+              <a:spcBef>
+                <a:spcPts val="1000"/>
+              </a:spcBef>
+              <a:buFont typeface="Arial" panose="020B0604020202020204" pitchFamily="34" charset="0"/>
+              <a:buChar char="•"/>
+              <a:defRPr sz="2800" kern="1200">
+                <a:solidFill>
+                  <a:schemeClr val="tx1"/>
+                </a:solidFill>
+                <a:latin typeface="+mn-lt"/>
+                <a:ea typeface="+mn-ea"/>
+                <a:cs typeface="+mn-cs"/>
+              </a:defRPr>
+            </a:lvl1pPr>
+            <a:lvl2pPr marL="685800" indent="-228600" algn="l" defTabSz="914400" rtl="0" eaLnBrk="1" latinLnBrk="0" hangingPunct="1">
+              <a:lnSpc>
+                <a:spcPct val="90000"/>
+              </a:lnSpc>
+              <a:spcBef>
+                <a:spcPts val="500"/>
+              </a:spcBef>
+              <a:buFont typeface="Arial" panose="020B0604020202020204" pitchFamily="34" charset="0"/>
+              <a:buChar char="•"/>
+              <a:defRPr sz="2400" kern="1200">
+                <a:solidFill>
+                  <a:schemeClr val="tx1"/>
+                </a:solidFill>
+                <a:latin typeface="+mn-lt"/>
+                <a:ea typeface="+mn-ea"/>
+                <a:cs typeface="+mn-cs"/>
+              </a:defRPr>
+            </a:lvl2pPr>
+            <a:lvl3pPr marL="1143000" indent="-228600" algn="l" defTabSz="914400" rtl="0" eaLnBrk="1" latinLnBrk="0" hangingPunct="1">
+              <a:lnSpc>
+                <a:spcPct val="90000"/>
+              </a:lnSpc>
+              <a:spcBef>
+                <a:spcPts val="500"/>
+              </a:spcBef>
+              <a:buFont typeface="Arial" panose="020B0604020202020204" pitchFamily="34" charset="0"/>
+              <a:buChar char="•"/>
+              <a:defRPr sz="2000" kern="1200">
+                <a:solidFill>
+                  <a:schemeClr val="tx1"/>
+                </a:solidFill>
+                <a:latin typeface="+mn-lt"/>
+                <a:ea typeface="+mn-ea"/>
+                <a:cs typeface="+mn-cs"/>
+              </a:defRPr>
+            </a:lvl3pPr>
+            <a:lvl4pPr marL="1600200" indent="-228600" algn="l" defTabSz="914400" rtl="0" eaLnBrk="1" latinLnBrk="0" hangingPunct="1">
+              <a:lnSpc>
+                <a:spcPct val="90000"/>
+              </a:lnSpc>
+              <a:spcBef>
+                <a:spcPts val="500"/>
+              </a:spcBef>
+              <a:buFont typeface="Arial" panose="020B0604020202020204" pitchFamily="34" charset="0"/>
+              <a:buChar char="•"/>
+              <a:defRPr sz="1800" kern="1200">
+                <a:solidFill>
+                  <a:schemeClr val="tx1"/>
+                </a:solidFill>
+                <a:latin typeface="+mn-lt"/>
+                <a:ea typeface="+mn-ea"/>
+                <a:cs typeface="+mn-cs"/>
+              </a:defRPr>
+            </a:lvl4pPr>
+            <a:lvl5pPr marL="2057400" indent="-228600" algn="l" defTabSz="914400" rtl="0" eaLnBrk="1" latinLnBrk="0" hangingPunct="1">
+              <a:lnSpc>
+                <a:spcPct val="90000"/>
+              </a:lnSpc>
+              <a:spcBef>
+                <a:spcPts val="500"/>
+              </a:spcBef>
+              <a:buFont typeface="Arial" panose="020B0604020202020204" pitchFamily="34" charset="0"/>
+              <a:buChar char="•"/>
+              <a:defRPr sz="1800" kern="1200">
+                <a:solidFill>
+                  <a:schemeClr val="tx1"/>
+                </a:solidFill>
+                <a:latin typeface="+mn-lt"/>
+                <a:ea typeface="+mn-ea"/>
+                <a:cs typeface="+mn-cs"/>
+              </a:defRPr>
+            </a:lvl5pPr>
+            <a:lvl6pPr marL="2514600" indent="-228600" algn="l" defTabSz="914400" rtl="0" eaLnBrk="1" latinLnBrk="0" hangingPunct="1">
+              <a:lnSpc>
+                <a:spcPct val="90000"/>
+              </a:lnSpc>
+              <a:spcBef>
+                <a:spcPts val="500"/>
+              </a:spcBef>
+              <a:buFont typeface="Arial" panose="020B0604020202020204" pitchFamily="34" charset="0"/>
+              <a:buChar char="•"/>
+              <a:defRPr sz="1800" kern="1200">
+                <a:solidFill>
+                  <a:schemeClr val="tx1"/>
+                </a:solidFill>
+                <a:latin typeface="+mn-lt"/>
+                <a:ea typeface="+mn-ea"/>
+                <a:cs typeface="+mn-cs"/>
+              </a:defRPr>
+            </a:lvl6pPr>
+            <a:lvl7pPr marL="2971800" indent="-228600" algn="l" defTabSz="914400" rtl="0" eaLnBrk="1" latinLnBrk="0" hangingPunct="1">
+              <a:lnSpc>
+                <a:spcPct val="90000"/>
+              </a:lnSpc>
+              <a:spcBef>
+                <a:spcPts val="500"/>
+              </a:spcBef>
+              <a:buFont typeface="Arial" panose="020B0604020202020204" pitchFamily="34" charset="0"/>
+              <a:buChar char="•"/>
+              <a:defRPr sz="1800" kern="1200">
+                <a:solidFill>
+                  <a:schemeClr val="tx1"/>
+                </a:solidFill>
+                <a:latin typeface="+mn-lt"/>
+                <a:ea typeface="+mn-ea"/>
+                <a:cs typeface="+mn-cs"/>
+              </a:defRPr>
+            </a:lvl7pPr>
+            <a:lvl8pPr marL="3429000" indent="-228600" algn="l" defTabSz="914400" rtl="0" eaLnBrk="1" latinLnBrk="0" hangingPunct="1">
+              <a:lnSpc>
+                <a:spcPct val="90000"/>
+              </a:lnSpc>
+              <a:spcBef>
+                <a:spcPts val="500"/>
+              </a:spcBef>
+              <a:buFont typeface="Arial" panose="020B0604020202020204" pitchFamily="34" charset="0"/>
+              <a:buChar char="•"/>
+              <a:defRPr sz="1800" kern="1200">
+                <a:solidFill>
+                  <a:schemeClr val="tx1"/>
+                </a:solidFill>
+                <a:latin typeface="+mn-lt"/>
+                <a:ea typeface="+mn-ea"/>
+                <a:cs typeface="+mn-cs"/>
+              </a:defRPr>
+            </a:lvl8pPr>
+            <a:lvl9pPr marL="3886200" indent="-228600" algn="l" defTabSz="914400" rtl="0" eaLnBrk="1" latinLnBrk="0" hangingPunct="1">
+              <a:lnSpc>
+                <a:spcPct val="90000"/>
+              </a:lnSpc>
+              <a:spcBef>
+                <a:spcPts val="500"/>
+              </a:spcBef>
+              <a:buFont typeface="Arial" panose="020B0604020202020204" pitchFamily="34" charset="0"/>
+              <a:buChar char="•"/>
+              <a:defRPr sz="1800" kern="1200">
+                <a:solidFill>
+                  <a:schemeClr val="tx1"/>
+                </a:solidFill>
+                <a:latin typeface="+mn-lt"/>
+                <a:ea typeface="+mn-ea"/>
+                <a:cs typeface="+mn-cs"/>
+              </a:defRPr>
+            </a:lvl9pPr>
+          </a:lstStyle>
+          <a:p>
+            <a:r>
+              <a:rPr lang="en-US" altLang="zh-CN" dirty="0"/>
+              <a:t>2. </a:t>
+            </a:r>
+            <a:r>
+              <a:rPr lang="en-US" altLang="zh-CN" b="1" dirty="0">
+                <a:solidFill>
+                  <a:srgbClr val="FF0000"/>
+                </a:solidFill>
+              </a:rPr>
+              <a:t>Syntax tree</a:t>
+            </a:r>
+          </a:p>
+          <a:p>
+            <a:pPr lvl="1"/>
+            <a:r>
+              <a:rPr lang="en-US" altLang="zh-CN" dirty="0"/>
+              <a:t>Tree and its traverse</a:t>
+            </a:r>
+          </a:p>
+          <a:p>
+            <a:pPr lvl="1"/>
+            <a:r>
+              <a:rPr lang="en-US" altLang="zh-CN" dirty="0"/>
+              <a:t>Stack and recursion</a:t>
+            </a:r>
+          </a:p>
+          <a:p>
+            <a:pPr lvl="1"/>
+            <a:r>
+              <a:rPr lang="en-US" altLang="zh-CN" dirty="0"/>
+              <a:t>Design Analyzer module by contract</a:t>
+            </a:r>
+          </a:p>
+          <a:p>
+            <a:pPr lvl="1"/>
+            <a:r>
+              <a:rPr lang="en-US" altLang="zh-CN" dirty="0"/>
+              <a:t>Disambiguation</a:t>
+            </a:r>
+          </a:p>
+          <a:p>
+            <a:pPr lvl="1"/>
+            <a:r>
+              <a:rPr lang="en-US" altLang="zh-CN" dirty="0"/>
+              <a:t>Obstacles</a:t>
+            </a:r>
+          </a:p>
+          <a:p>
+            <a:pPr lvl="1"/>
+            <a:r>
+              <a:rPr lang="en-US" altLang="zh-CN" dirty="0"/>
+              <a:t>Comments</a:t>
+            </a:r>
+          </a:p>
+          <a:p>
+            <a:pPr lvl="1"/>
+            <a:r>
+              <a:rPr lang="en-US" altLang="zh-CN" dirty="0" err="1"/>
+              <a:t>Dockerization</a:t>
+            </a:r>
+            <a:endParaRPr lang="en-US" altLang="zh-CN" dirty="0"/>
+          </a:p>
+          <a:p>
+            <a:endParaRPr lang="en-US" altLang="zh-CN" dirty="0"/>
+          </a:p>
+          <a:p>
+            <a:pPr lvl="1"/>
+            <a:endParaRPr lang="zh-CN" altLang="en-US" dirty="0"/>
+          </a:p>
+        </p:txBody>
+      </p:sp>
+      <p:sp>
+        <p:nvSpPr>
+          <p:cNvPr id="6" name="内容占位符 2">
+            <a:extLst>
+              <a:ext uri="{FF2B5EF4-FFF2-40B4-BE49-F238E27FC236}">
+                <a16:creationId xmlns:a16="http://schemas.microsoft.com/office/drawing/2014/main" id="{9B17A034-6998-4BEC-A723-62BA93D217D9}"/>
+              </a:ext>
+            </a:extLst>
+          </p:cNvPr>
+          <p:cNvSpPr txBox="1">
+            <a:spLocks/>
+          </p:cNvSpPr>
+          <p:nvPr/>
+        </p:nvSpPr>
+        <p:spPr>
+          <a:xfrm>
+            <a:off x="8113058" y="365124"/>
+            <a:ext cx="3635188" cy="6214969"/>
+          </a:xfrm>
+          <a:prstGeom prst="rect">
+            <a:avLst/>
+          </a:prstGeom>
+        </p:spPr>
+        <p:txBody>
+          <a:bodyPr vert="horz" lIns="91440" tIns="45720" rIns="91440" bIns="45720" rtlCol="0">
+            <a:normAutofit/>
+          </a:bodyPr>
+          <a:lstStyle>
+            <a:lvl1pPr marL="228600" indent="-228600" algn="l" defTabSz="914400" rtl="0" eaLnBrk="1" latinLnBrk="0" hangingPunct="1">
+              <a:lnSpc>
+                <a:spcPct val="90000"/>
+              </a:lnSpc>
+              <a:spcBef>
+                <a:spcPts val="1000"/>
+              </a:spcBef>
+              <a:buFont typeface="Arial" panose="020B0604020202020204" pitchFamily="34" charset="0"/>
+              <a:buChar char="•"/>
+              <a:defRPr sz="2800" kern="1200">
+                <a:solidFill>
+                  <a:schemeClr val="tx1"/>
+                </a:solidFill>
+                <a:latin typeface="+mn-lt"/>
+                <a:ea typeface="+mn-ea"/>
+                <a:cs typeface="+mn-cs"/>
+              </a:defRPr>
+            </a:lvl1pPr>
+            <a:lvl2pPr marL="685800" indent="-228600" algn="l" defTabSz="914400" rtl="0" eaLnBrk="1" latinLnBrk="0" hangingPunct="1">
+              <a:lnSpc>
+                <a:spcPct val="90000"/>
+              </a:lnSpc>
+              <a:spcBef>
+                <a:spcPts val="500"/>
+              </a:spcBef>
+              <a:buFont typeface="Arial" panose="020B0604020202020204" pitchFamily="34" charset="0"/>
+              <a:buChar char="•"/>
+              <a:defRPr sz="2400" kern="1200">
+                <a:solidFill>
+                  <a:schemeClr val="tx1"/>
+                </a:solidFill>
+                <a:latin typeface="+mn-lt"/>
+                <a:ea typeface="+mn-ea"/>
+                <a:cs typeface="+mn-cs"/>
+              </a:defRPr>
+            </a:lvl2pPr>
+            <a:lvl3pPr marL="1143000" indent="-228600" algn="l" defTabSz="914400" rtl="0" eaLnBrk="1" latinLnBrk="0" hangingPunct="1">
+              <a:lnSpc>
+                <a:spcPct val="90000"/>
+              </a:lnSpc>
+              <a:spcBef>
+                <a:spcPts val="500"/>
+              </a:spcBef>
+              <a:buFont typeface="Arial" panose="020B0604020202020204" pitchFamily="34" charset="0"/>
+              <a:buChar char="•"/>
+              <a:defRPr sz="2000" kern="1200">
+                <a:solidFill>
+                  <a:schemeClr val="tx1"/>
+                </a:solidFill>
+                <a:latin typeface="+mn-lt"/>
+                <a:ea typeface="+mn-ea"/>
+                <a:cs typeface="+mn-cs"/>
+              </a:defRPr>
+            </a:lvl3pPr>
+            <a:lvl4pPr marL="1600200" indent="-228600" algn="l" defTabSz="914400" rtl="0" eaLnBrk="1" latinLnBrk="0" hangingPunct="1">
+              <a:lnSpc>
+                <a:spcPct val="90000"/>
+              </a:lnSpc>
+              <a:spcBef>
+                <a:spcPts val="500"/>
+              </a:spcBef>
+              <a:buFont typeface="Arial" panose="020B0604020202020204" pitchFamily="34" charset="0"/>
+              <a:buChar char="•"/>
+              <a:defRPr sz="1800" kern="1200">
+                <a:solidFill>
+                  <a:schemeClr val="tx1"/>
+                </a:solidFill>
+                <a:latin typeface="+mn-lt"/>
+                <a:ea typeface="+mn-ea"/>
+                <a:cs typeface="+mn-cs"/>
+              </a:defRPr>
+            </a:lvl4pPr>
+            <a:lvl5pPr marL="2057400" indent="-228600" algn="l" defTabSz="914400" rtl="0" eaLnBrk="1" latinLnBrk="0" hangingPunct="1">
+              <a:lnSpc>
+                <a:spcPct val="90000"/>
+              </a:lnSpc>
+              <a:spcBef>
+                <a:spcPts val="500"/>
+              </a:spcBef>
+              <a:buFont typeface="Arial" panose="020B0604020202020204" pitchFamily="34" charset="0"/>
+              <a:buChar char="•"/>
+              <a:defRPr sz="1800" kern="1200">
+                <a:solidFill>
+                  <a:schemeClr val="tx1"/>
+                </a:solidFill>
+                <a:latin typeface="+mn-lt"/>
+                <a:ea typeface="+mn-ea"/>
+                <a:cs typeface="+mn-cs"/>
+              </a:defRPr>
+            </a:lvl5pPr>
+            <a:lvl6pPr marL="2514600" indent="-228600" algn="l" defTabSz="914400" rtl="0" eaLnBrk="1" latinLnBrk="0" hangingPunct="1">
+              <a:lnSpc>
+                <a:spcPct val="90000"/>
+              </a:lnSpc>
+              <a:spcBef>
+                <a:spcPts val="500"/>
+              </a:spcBef>
+              <a:buFont typeface="Arial" panose="020B0604020202020204" pitchFamily="34" charset="0"/>
+              <a:buChar char="•"/>
+              <a:defRPr sz="1800" kern="1200">
+                <a:solidFill>
+                  <a:schemeClr val="tx1"/>
+                </a:solidFill>
+                <a:latin typeface="+mn-lt"/>
+                <a:ea typeface="+mn-ea"/>
+                <a:cs typeface="+mn-cs"/>
+              </a:defRPr>
+            </a:lvl6pPr>
+            <a:lvl7pPr marL="2971800" indent="-228600" algn="l" defTabSz="914400" rtl="0" eaLnBrk="1" latinLnBrk="0" hangingPunct="1">
+              <a:lnSpc>
+                <a:spcPct val="90000"/>
+              </a:lnSpc>
+              <a:spcBef>
+                <a:spcPts val="500"/>
+              </a:spcBef>
+              <a:buFont typeface="Arial" panose="020B0604020202020204" pitchFamily="34" charset="0"/>
+              <a:buChar char="•"/>
+              <a:defRPr sz="1800" kern="1200">
+                <a:solidFill>
+                  <a:schemeClr val="tx1"/>
+                </a:solidFill>
+                <a:latin typeface="+mn-lt"/>
+                <a:ea typeface="+mn-ea"/>
+                <a:cs typeface="+mn-cs"/>
+              </a:defRPr>
+            </a:lvl7pPr>
+            <a:lvl8pPr marL="3429000" indent="-228600" algn="l" defTabSz="914400" rtl="0" eaLnBrk="1" latinLnBrk="0" hangingPunct="1">
+              <a:lnSpc>
+                <a:spcPct val="90000"/>
+              </a:lnSpc>
+              <a:spcBef>
+                <a:spcPts val="500"/>
+              </a:spcBef>
+              <a:buFont typeface="Arial" panose="020B0604020202020204" pitchFamily="34" charset="0"/>
+              <a:buChar char="•"/>
+              <a:defRPr sz="1800" kern="1200">
+                <a:solidFill>
+                  <a:schemeClr val="tx1"/>
+                </a:solidFill>
+                <a:latin typeface="+mn-lt"/>
+                <a:ea typeface="+mn-ea"/>
+                <a:cs typeface="+mn-cs"/>
+              </a:defRPr>
+            </a:lvl8pPr>
+            <a:lvl9pPr marL="3886200" indent="-228600" algn="l" defTabSz="914400" rtl="0" eaLnBrk="1" latinLnBrk="0" hangingPunct="1">
+              <a:lnSpc>
+                <a:spcPct val="90000"/>
+              </a:lnSpc>
+              <a:spcBef>
+                <a:spcPts val="500"/>
+              </a:spcBef>
+              <a:buFont typeface="Arial" panose="020B0604020202020204" pitchFamily="34" charset="0"/>
+              <a:buChar char="•"/>
+              <a:defRPr sz="1800" kern="1200">
+                <a:solidFill>
+                  <a:schemeClr val="tx1"/>
+                </a:solidFill>
+                <a:latin typeface="+mn-lt"/>
+                <a:ea typeface="+mn-ea"/>
+                <a:cs typeface="+mn-cs"/>
+              </a:defRPr>
+            </a:lvl9pPr>
+          </a:lstStyle>
+          <a:p>
+            <a:r>
+              <a:rPr lang="en-US" altLang="zh-CN" dirty="0"/>
+              <a:t>3. </a:t>
+            </a:r>
+            <a:r>
+              <a:rPr lang="en-US" altLang="zh-CN" b="1" dirty="0">
+                <a:solidFill>
+                  <a:srgbClr val="FF0000"/>
+                </a:solidFill>
+              </a:rPr>
+              <a:t>Code generation</a:t>
+            </a:r>
+          </a:p>
+          <a:p>
+            <a:pPr lvl="1"/>
+            <a:r>
+              <a:rPr lang="en-US" altLang="zh-CN" dirty="0"/>
+              <a:t>Stack-based VM</a:t>
+            </a:r>
+          </a:p>
+          <a:p>
+            <a:pPr lvl="1"/>
+            <a:r>
+              <a:rPr lang="en-US" altLang="zh-CN" dirty="0"/>
+              <a:t>Memory</a:t>
+            </a:r>
+            <a:r>
+              <a:rPr lang="zh-CN" altLang="en-US" dirty="0"/>
+              <a:t> </a:t>
+            </a:r>
+            <a:r>
+              <a:rPr lang="en-US" altLang="zh-CN" dirty="0"/>
+              <a:t>allocation</a:t>
+            </a:r>
+          </a:p>
+          <a:p>
+            <a:pPr lvl="1"/>
+            <a:r>
+              <a:rPr lang="en-US" altLang="zh-CN" dirty="0"/>
+              <a:t>Handling Lifecycle</a:t>
+            </a:r>
+          </a:p>
+          <a:p>
+            <a:pPr lvl="1"/>
+            <a:r>
+              <a:rPr lang="en-US" altLang="zh-CN" dirty="0"/>
+              <a:t>Parsing expressions</a:t>
+            </a:r>
+          </a:p>
+          <a:p>
+            <a:pPr lvl="1"/>
+            <a:r>
+              <a:rPr lang="en-US" altLang="zh-CN" dirty="0"/>
+              <a:t>Subroutine calls</a:t>
+            </a:r>
+          </a:p>
+          <a:p>
+            <a:pPr lvl="1"/>
+            <a:r>
+              <a:rPr lang="en-US" altLang="zh-CN" dirty="0"/>
+              <a:t>Obstacles</a:t>
+            </a:r>
+          </a:p>
+          <a:p>
+            <a:pPr lvl="1"/>
+            <a:r>
+              <a:rPr lang="en-US" altLang="zh-CN" dirty="0"/>
+              <a:t>Comments</a:t>
+            </a:r>
+          </a:p>
+          <a:p>
+            <a:endParaRPr lang="en-US" altLang="zh-CN" dirty="0"/>
+          </a:p>
+          <a:p>
+            <a:r>
+              <a:rPr lang="en-US" altLang="zh-CN" dirty="0"/>
+              <a:t>4. </a:t>
+            </a:r>
+            <a:r>
+              <a:rPr lang="en-US" altLang="zh-CN" b="1" dirty="0">
+                <a:solidFill>
+                  <a:srgbClr val="FF0000"/>
+                </a:solidFill>
+              </a:rPr>
+              <a:t>Documentation</a:t>
+            </a:r>
+          </a:p>
+          <a:p>
+            <a:pPr lvl="1"/>
+            <a:r>
+              <a:rPr lang="en-US" altLang="zh-CN" dirty="0"/>
+              <a:t>Java docs</a:t>
+            </a:r>
+          </a:p>
+          <a:p>
+            <a:pPr lvl="1"/>
+            <a:r>
+              <a:rPr lang="en-US" altLang="zh-CN" dirty="0"/>
+              <a:t>Readme file</a:t>
+            </a:r>
+          </a:p>
+          <a:p>
+            <a:endParaRPr lang="en-US" altLang="zh-CN" dirty="0"/>
+          </a:p>
+          <a:p>
+            <a:r>
+              <a:rPr lang="en-US" altLang="zh-CN" dirty="0"/>
+              <a:t>References</a:t>
+            </a:r>
+            <a:endParaRPr lang="zh-CN" altLang="en-US" dirty="0"/>
+          </a:p>
+        </p:txBody>
+      </p:sp>
+      <p:sp>
+        <p:nvSpPr>
+          <p:cNvPr id="7" name="文本框 6">
+            <a:extLst>
+              <a:ext uri="{FF2B5EF4-FFF2-40B4-BE49-F238E27FC236}">
+                <a16:creationId xmlns:a16="http://schemas.microsoft.com/office/drawing/2014/main" id="{18771EC0-E283-4D7B-B5DC-76D37A8C19B0}"/>
+              </a:ext>
+            </a:extLst>
+          </p:cNvPr>
+          <p:cNvSpPr txBox="1"/>
+          <p:nvPr/>
+        </p:nvSpPr>
+        <p:spPr>
+          <a:xfrm>
+            <a:off x="466165" y="5970494"/>
+            <a:ext cx="6490447" cy="369332"/>
+          </a:xfrm>
+          <a:prstGeom prst="rect">
+            <a:avLst/>
+          </a:prstGeom>
+          <a:noFill/>
+        </p:spPr>
+        <p:txBody>
+          <a:bodyPr wrap="square" rtlCol="0">
+            <a:spAutoFit/>
+          </a:bodyPr>
+          <a:lstStyle/>
+          <a:p>
+            <a:r>
+              <a:rPr lang="zh-CN" altLang="en-US" dirty="0"/>
+              <a:t>任务分工：</a:t>
+            </a:r>
+            <a:r>
+              <a:rPr lang="zh-CN" altLang="en-US" dirty="0">
+                <a:solidFill>
+                  <a:srgbClr val="FF0000"/>
+                </a:solidFill>
+              </a:rPr>
+              <a:t>金帆</a:t>
+            </a:r>
+            <a:r>
+              <a:rPr lang="zh-CN" altLang="en-US" dirty="0"/>
+              <a:t>  </a:t>
+            </a:r>
+            <a:r>
+              <a:rPr lang="zh-CN" altLang="en-US" dirty="0">
+                <a:solidFill>
+                  <a:schemeClr val="accent1"/>
+                </a:solidFill>
+              </a:rPr>
+              <a:t>李浩源</a:t>
+            </a:r>
+            <a:r>
+              <a:rPr lang="zh-CN" altLang="en-US" dirty="0"/>
+              <a:t>  </a:t>
+            </a:r>
+            <a:r>
+              <a:rPr lang="zh-CN" altLang="en-US" dirty="0">
+                <a:solidFill>
+                  <a:srgbClr val="00B050"/>
+                </a:solidFill>
+              </a:rPr>
+              <a:t>李闫涛</a:t>
+            </a:r>
+          </a:p>
+        </p:txBody>
+      </p:sp>
+    </p:spTree>
+    <p:extLst>
+      <p:ext uri="{BB962C8B-B14F-4D97-AF65-F5344CB8AC3E}">
+        <p14:creationId xmlns:p14="http://schemas.microsoft.com/office/powerpoint/2010/main" val="2946092737"/>
       </p:ext>
     </p:extLst>
   </p:cSld>

</xml_diff>